<commit_message>
- mise  à jour de prez
</commit_message>
<xml_diff>
--- a/IHM_image et maquette.pptx
+++ b/IHM_image et maquette.pptx
@@ -245,7 +245,7 @@
           <a:p>
             <a:fld id="{871A6DF6-7ECA-4653-933B-4FFC9B759431}" type="datetimeFigureOut">
               <a:rPr lang="fr-FR" smtClean="0"/>
-              <a:t>13/12/2014</a:t>
+              <a:t>05/01/2015</a:t>
             </a:fld>
             <a:endParaRPr lang="fr-FR"/>
           </a:p>
@@ -415,7 +415,7 @@
           <a:p>
             <a:fld id="{871A6DF6-7ECA-4653-933B-4FFC9B759431}" type="datetimeFigureOut">
               <a:rPr lang="fr-FR" smtClean="0"/>
-              <a:t>13/12/2014</a:t>
+              <a:t>05/01/2015</a:t>
             </a:fld>
             <a:endParaRPr lang="fr-FR"/>
           </a:p>
@@ -595,7 +595,7 @@
           <a:p>
             <a:fld id="{871A6DF6-7ECA-4653-933B-4FFC9B759431}" type="datetimeFigureOut">
               <a:rPr lang="fr-FR" smtClean="0"/>
-              <a:t>13/12/2014</a:t>
+              <a:t>05/01/2015</a:t>
             </a:fld>
             <a:endParaRPr lang="fr-FR"/>
           </a:p>
@@ -765,7 +765,7 @@
           <a:p>
             <a:fld id="{871A6DF6-7ECA-4653-933B-4FFC9B759431}" type="datetimeFigureOut">
               <a:rPr lang="fr-FR" smtClean="0"/>
-              <a:t>13/12/2014</a:t>
+              <a:t>05/01/2015</a:t>
             </a:fld>
             <a:endParaRPr lang="fr-FR"/>
           </a:p>
@@ -1011,7 +1011,7 @@
           <a:p>
             <a:fld id="{871A6DF6-7ECA-4653-933B-4FFC9B759431}" type="datetimeFigureOut">
               <a:rPr lang="fr-FR" smtClean="0"/>
-              <a:t>13/12/2014</a:t>
+              <a:t>05/01/2015</a:t>
             </a:fld>
             <a:endParaRPr lang="fr-FR"/>
           </a:p>
@@ -1243,7 +1243,7 @@
           <a:p>
             <a:fld id="{871A6DF6-7ECA-4653-933B-4FFC9B759431}" type="datetimeFigureOut">
               <a:rPr lang="fr-FR" smtClean="0"/>
-              <a:t>13/12/2014</a:t>
+              <a:t>05/01/2015</a:t>
             </a:fld>
             <a:endParaRPr lang="fr-FR"/>
           </a:p>
@@ -1610,7 +1610,7 @@
           <a:p>
             <a:fld id="{871A6DF6-7ECA-4653-933B-4FFC9B759431}" type="datetimeFigureOut">
               <a:rPr lang="fr-FR" smtClean="0"/>
-              <a:t>13/12/2014</a:t>
+              <a:t>05/01/2015</a:t>
             </a:fld>
             <a:endParaRPr lang="fr-FR"/>
           </a:p>
@@ -1728,7 +1728,7 @@
           <a:p>
             <a:fld id="{871A6DF6-7ECA-4653-933B-4FFC9B759431}" type="datetimeFigureOut">
               <a:rPr lang="fr-FR" smtClean="0"/>
-              <a:t>13/12/2014</a:t>
+              <a:t>05/01/2015</a:t>
             </a:fld>
             <a:endParaRPr lang="fr-FR"/>
           </a:p>
@@ -1823,7 +1823,7 @@
           <a:p>
             <a:fld id="{871A6DF6-7ECA-4653-933B-4FFC9B759431}" type="datetimeFigureOut">
               <a:rPr lang="fr-FR" smtClean="0"/>
-              <a:t>13/12/2014</a:t>
+              <a:t>05/01/2015</a:t>
             </a:fld>
             <a:endParaRPr lang="fr-FR"/>
           </a:p>
@@ -2100,7 +2100,7 @@
           <a:p>
             <a:fld id="{871A6DF6-7ECA-4653-933B-4FFC9B759431}" type="datetimeFigureOut">
               <a:rPr lang="fr-FR" smtClean="0"/>
-              <a:t>13/12/2014</a:t>
+              <a:t>05/01/2015</a:t>
             </a:fld>
             <a:endParaRPr lang="fr-FR"/>
           </a:p>
@@ -2353,7 +2353,7 @@
           <a:p>
             <a:fld id="{871A6DF6-7ECA-4653-933B-4FFC9B759431}" type="datetimeFigureOut">
               <a:rPr lang="fr-FR" smtClean="0"/>
-              <a:t>13/12/2014</a:t>
+              <a:t>05/01/2015</a:t>
             </a:fld>
             <a:endParaRPr lang="fr-FR"/>
           </a:p>
@@ -2566,7 +2566,7 @@
           <a:p>
             <a:fld id="{871A6DF6-7ECA-4653-933B-4FFC9B759431}" type="datetimeFigureOut">
               <a:rPr lang="fr-FR" smtClean="0"/>
-              <a:t>13/12/2014</a:t>
+              <a:t>05/01/2015</a:t>
             </a:fld>
             <a:endParaRPr lang="fr-FR"/>
           </a:p>
@@ -4496,198 +4496,6 @@
       </p:sp>
       <p:sp>
         <p:nvSpPr>
-          <p:cNvPr id="5" name="Rectangle 4"/>
-          <p:cNvSpPr/>
-          <p:nvPr/>
-        </p:nvSpPr>
-        <p:spPr>
-          <a:xfrm>
-            <a:off x="3243963" y="1420317"/>
-            <a:ext cx="460363" cy="391620"/>
-          </a:xfrm>
-          <a:prstGeom prst="rect">
-            <a:avLst/>
-          </a:prstGeom>
-          <a:solidFill>
-            <a:srgbClr val="FF0000"/>
-          </a:solidFill>
-          <a:ln w="28575">
-            <a:solidFill>
-              <a:schemeClr val="bg1"/>
-            </a:solidFill>
-          </a:ln>
-        </p:spPr>
-        <p:style>
-          <a:lnRef idx="2">
-            <a:schemeClr val="accent1">
-              <a:shade val="50000"/>
-            </a:schemeClr>
-          </a:lnRef>
-          <a:fillRef idx="1">
-            <a:schemeClr val="accent1"/>
-          </a:fillRef>
-          <a:effectRef idx="0">
-            <a:schemeClr val="accent1"/>
-          </a:effectRef>
-          <a:fontRef idx="minor">
-            <a:schemeClr val="lt1"/>
-          </a:fontRef>
-        </p:style>
-        <p:txBody>
-          <a:bodyPr rtlCol="0" anchor="ctr"/>
-          <a:lstStyle/>
-          <a:p>
-            <a:pPr algn="ctr"/>
-            <a:endParaRPr lang="fr-FR"/>
-          </a:p>
-        </p:txBody>
-      </p:sp>
-      <p:sp>
-        <p:nvSpPr>
-          <p:cNvPr id="6" name="Ellipse 5"/>
-          <p:cNvSpPr/>
-          <p:nvPr/>
-        </p:nvSpPr>
-        <p:spPr>
-          <a:xfrm>
-            <a:off x="5011343" y="1420317"/>
-            <a:ext cx="460365" cy="391620"/>
-          </a:xfrm>
-          <a:prstGeom prst="ellipse">
-            <a:avLst/>
-          </a:prstGeom>
-          <a:solidFill>
-            <a:srgbClr val="0070C0"/>
-          </a:solidFill>
-          <a:ln>
-            <a:solidFill>
-              <a:schemeClr val="bg1"/>
-            </a:solidFill>
-          </a:ln>
-        </p:spPr>
-        <p:style>
-          <a:lnRef idx="2">
-            <a:schemeClr val="accent1">
-              <a:shade val="50000"/>
-            </a:schemeClr>
-          </a:lnRef>
-          <a:fillRef idx="1">
-            <a:schemeClr val="accent1"/>
-          </a:fillRef>
-          <a:effectRef idx="0">
-            <a:schemeClr val="accent1"/>
-          </a:effectRef>
-          <a:fontRef idx="minor">
-            <a:schemeClr val="lt1"/>
-          </a:fontRef>
-        </p:style>
-        <p:txBody>
-          <a:bodyPr rtlCol="0" anchor="ctr"/>
-          <a:lstStyle/>
-          <a:p>
-            <a:pPr algn="ctr"/>
-            <a:endParaRPr lang="fr-FR"/>
-          </a:p>
-        </p:txBody>
-      </p:sp>
-      <p:sp>
-        <p:nvSpPr>
-          <p:cNvPr id="7" name="Corde 6"/>
-          <p:cNvSpPr/>
-          <p:nvPr/>
-        </p:nvSpPr>
-        <p:spPr>
-          <a:xfrm>
-            <a:off x="3905877" y="1420317"/>
-            <a:ext cx="460365" cy="391620"/>
-          </a:xfrm>
-          <a:prstGeom prst="chord">
-            <a:avLst/>
-          </a:prstGeom>
-          <a:solidFill>
-            <a:schemeClr val="tx1"/>
-          </a:solidFill>
-          <a:ln>
-            <a:solidFill>
-              <a:schemeClr val="bg1"/>
-            </a:solidFill>
-          </a:ln>
-        </p:spPr>
-        <p:style>
-          <a:lnRef idx="2">
-            <a:schemeClr val="accent1">
-              <a:shade val="50000"/>
-            </a:schemeClr>
-          </a:lnRef>
-          <a:fillRef idx="1">
-            <a:schemeClr val="accent1"/>
-          </a:fillRef>
-          <a:effectRef idx="0">
-            <a:schemeClr val="accent1"/>
-          </a:effectRef>
-          <a:fontRef idx="minor">
-            <a:schemeClr val="lt1"/>
-          </a:fontRef>
-        </p:style>
-        <p:txBody>
-          <a:bodyPr rtlCol="0" anchor="ctr"/>
-          <a:lstStyle/>
-          <a:p>
-            <a:pPr algn="ctr"/>
-            <a:endParaRPr lang="fr-FR"/>
-          </a:p>
-        </p:txBody>
-      </p:sp>
-      <p:sp>
-        <p:nvSpPr>
-          <p:cNvPr id="8" name="Triangle isocèle 7"/>
-          <p:cNvSpPr/>
-          <p:nvPr/>
-        </p:nvSpPr>
-        <p:spPr>
-          <a:xfrm>
-            <a:off x="4458612" y="1420317"/>
-            <a:ext cx="460361" cy="391620"/>
-          </a:xfrm>
-          <a:prstGeom prst="triangle">
-            <a:avLst/>
-          </a:prstGeom>
-          <a:solidFill>
-            <a:srgbClr val="00B050"/>
-          </a:solidFill>
-          <a:ln>
-            <a:solidFill>
-              <a:schemeClr val="bg1"/>
-            </a:solidFill>
-          </a:ln>
-        </p:spPr>
-        <p:style>
-          <a:lnRef idx="2">
-            <a:schemeClr val="accent1">
-              <a:shade val="50000"/>
-            </a:schemeClr>
-          </a:lnRef>
-          <a:fillRef idx="1">
-            <a:schemeClr val="accent1"/>
-          </a:fillRef>
-          <a:effectRef idx="0">
-            <a:schemeClr val="accent1"/>
-          </a:effectRef>
-          <a:fontRef idx="minor">
-            <a:schemeClr val="lt1"/>
-          </a:fontRef>
-        </p:style>
-        <p:txBody>
-          <a:bodyPr rtlCol="0" anchor="ctr"/>
-          <a:lstStyle/>
-          <a:p>
-            <a:pPr algn="ctr"/>
-            <a:endParaRPr lang="fr-FR"/>
-          </a:p>
-        </p:txBody>
-      </p:sp>
-      <p:sp>
-        <p:nvSpPr>
           <p:cNvPr id="11" name="ZoneTexte 10"/>
           <p:cNvSpPr txBox="1"/>
           <p:nvPr/>
@@ -5092,6 +4900,451 @@
           </a:prstGeom>
         </p:spPr>
       </p:pic>
+      <p:grpSp>
+        <p:nvGrpSpPr>
+          <p:cNvPr id="4" name="Groupe 3"/>
+          <p:cNvGrpSpPr/>
+          <p:nvPr/>
+        </p:nvGrpSpPr>
+        <p:grpSpPr>
+          <a:xfrm>
+            <a:off x="5011344" y="1420316"/>
+            <a:ext cx="638830" cy="640495"/>
+            <a:chOff x="5011344" y="1420316"/>
+            <a:chExt cx="638830" cy="640495"/>
+          </a:xfrm>
+        </p:grpSpPr>
+        <p:sp>
+          <p:nvSpPr>
+            <p:cNvPr id="6" name="Ellipse 5"/>
+            <p:cNvSpPr/>
+            <p:nvPr/>
+          </p:nvSpPr>
+          <p:spPr>
+            <a:xfrm>
+              <a:off x="5011344" y="1420316"/>
+              <a:ext cx="638830" cy="640495"/>
+            </a:xfrm>
+            <a:prstGeom prst="ellipse">
+              <a:avLst/>
+            </a:prstGeom>
+            <a:solidFill>
+              <a:srgbClr val="0070C0"/>
+            </a:solidFill>
+            <a:ln w="38100">
+              <a:solidFill>
+                <a:schemeClr val="bg1"/>
+              </a:solidFill>
+            </a:ln>
+          </p:spPr>
+          <p:style>
+            <a:lnRef idx="2">
+              <a:schemeClr val="accent1">
+                <a:shade val="50000"/>
+              </a:schemeClr>
+            </a:lnRef>
+            <a:fillRef idx="1">
+              <a:schemeClr val="accent1"/>
+            </a:fillRef>
+            <a:effectRef idx="0">
+              <a:schemeClr val="accent1"/>
+            </a:effectRef>
+            <a:fontRef idx="minor">
+              <a:schemeClr val="lt1"/>
+            </a:fontRef>
+          </p:style>
+          <p:txBody>
+            <a:bodyPr rtlCol="0" anchor="ctr"/>
+            <a:lstStyle/>
+            <a:p>
+              <a:pPr algn="ctr"/>
+              <a:endParaRPr lang="fr-FR"/>
+            </a:p>
+          </p:txBody>
+        </p:sp>
+        <p:sp>
+          <p:nvSpPr>
+            <p:cNvPr id="34" name="Ellipse 33"/>
+            <p:cNvSpPr/>
+            <p:nvPr/>
+          </p:nvSpPr>
+          <p:spPr>
+            <a:xfrm>
+              <a:off x="5196235" y="1619366"/>
+              <a:ext cx="246297" cy="246938"/>
+            </a:xfrm>
+            <a:prstGeom prst="ellipse">
+              <a:avLst/>
+            </a:prstGeom>
+            <a:solidFill>
+              <a:schemeClr val="bg1"/>
+            </a:solidFill>
+            <a:ln w="38100">
+              <a:solidFill>
+                <a:schemeClr val="bg1"/>
+              </a:solidFill>
+            </a:ln>
+          </p:spPr>
+          <p:style>
+            <a:lnRef idx="2">
+              <a:schemeClr val="accent1">
+                <a:shade val="50000"/>
+              </a:schemeClr>
+            </a:lnRef>
+            <a:fillRef idx="1">
+              <a:schemeClr val="accent1"/>
+            </a:fillRef>
+            <a:effectRef idx="0">
+              <a:schemeClr val="accent1"/>
+            </a:effectRef>
+            <a:fontRef idx="minor">
+              <a:schemeClr val="lt1"/>
+            </a:fontRef>
+          </p:style>
+          <p:txBody>
+            <a:bodyPr rtlCol="0" anchor="ctr"/>
+            <a:lstStyle/>
+            <a:p>
+              <a:pPr algn="ctr"/>
+              <a:endParaRPr lang="fr-FR"/>
+            </a:p>
+          </p:txBody>
+        </p:sp>
+      </p:grpSp>
+      <p:grpSp>
+        <p:nvGrpSpPr>
+          <p:cNvPr id="3" name="Groupe 2"/>
+          <p:cNvGrpSpPr/>
+          <p:nvPr/>
+        </p:nvGrpSpPr>
+        <p:grpSpPr>
+          <a:xfrm>
+            <a:off x="4091703" y="1394797"/>
+            <a:ext cx="896890" cy="666013"/>
+            <a:chOff x="4091703" y="1394797"/>
+            <a:chExt cx="896890" cy="666013"/>
+          </a:xfrm>
+        </p:grpSpPr>
+        <p:sp>
+          <p:nvSpPr>
+            <p:cNvPr id="8" name="Triangle isocèle 7"/>
+            <p:cNvSpPr/>
+            <p:nvPr/>
+          </p:nvSpPr>
+          <p:spPr>
+            <a:xfrm>
+              <a:off x="4091703" y="1394797"/>
+              <a:ext cx="896890" cy="666013"/>
+            </a:xfrm>
+            <a:prstGeom prst="triangle">
+              <a:avLst/>
+            </a:prstGeom>
+            <a:solidFill>
+              <a:srgbClr val="00B050"/>
+            </a:solidFill>
+            <a:ln w="38100">
+              <a:solidFill>
+                <a:schemeClr val="bg1"/>
+              </a:solidFill>
+            </a:ln>
+          </p:spPr>
+          <p:style>
+            <a:lnRef idx="2">
+              <a:schemeClr val="accent1">
+                <a:shade val="50000"/>
+              </a:schemeClr>
+            </a:lnRef>
+            <a:fillRef idx="1">
+              <a:schemeClr val="accent1"/>
+            </a:fillRef>
+            <a:effectRef idx="0">
+              <a:schemeClr val="accent1"/>
+            </a:effectRef>
+            <a:fontRef idx="minor">
+              <a:schemeClr val="lt1"/>
+            </a:fontRef>
+          </p:style>
+          <p:txBody>
+            <a:bodyPr rtlCol="0" anchor="ctr"/>
+            <a:lstStyle/>
+            <a:p>
+              <a:pPr algn="ctr"/>
+              <a:endParaRPr lang="fr-FR"/>
+            </a:p>
+          </p:txBody>
+        </p:sp>
+        <p:sp>
+          <p:nvSpPr>
+            <p:cNvPr id="35" name="Ellipse 34"/>
+            <p:cNvSpPr/>
+            <p:nvPr/>
+          </p:nvSpPr>
+          <p:spPr>
+            <a:xfrm>
+              <a:off x="4393013" y="1697639"/>
+              <a:ext cx="274522" cy="277239"/>
+            </a:xfrm>
+            <a:prstGeom prst="ellipse">
+              <a:avLst/>
+            </a:prstGeom>
+            <a:solidFill>
+              <a:schemeClr val="bg1"/>
+            </a:solidFill>
+            <a:ln w="38100">
+              <a:solidFill>
+                <a:schemeClr val="bg1"/>
+              </a:solidFill>
+            </a:ln>
+          </p:spPr>
+          <p:style>
+            <a:lnRef idx="2">
+              <a:schemeClr val="accent1">
+                <a:shade val="50000"/>
+              </a:schemeClr>
+            </a:lnRef>
+            <a:fillRef idx="1">
+              <a:schemeClr val="accent1"/>
+            </a:fillRef>
+            <a:effectRef idx="0">
+              <a:schemeClr val="accent1"/>
+            </a:effectRef>
+            <a:fontRef idx="minor">
+              <a:schemeClr val="lt1"/>
+            </a:fontRef>
+          </p:style>
+          <p:txBody>
+            <a:bodyPr rtlCol="0" anchor="ctr"/>
+            <a:lstStyle/>
+            <a:p>
+              <a:pPr algn="ctr"/>
+              <a:endParaRPr lang="fr-FR"/>
+            </a:p>
+          </p:txBody>
+        </p:sp>
+      </p:grpSp>
+      <p:grpSp>
+        <p:nvGrpSpPr>
+          <p:cNvPr id="12" name="Groupe 11"/>
+          <p:cNvGrpSpPr/>
+          <p:nvPr/>
+        </p:nvGrpSpPr>
+        <p:grpSpPr>
+          <a:xfrm>
+            <a:off x="3847378" y="546859"/>
+            <a:ext cx="820157" cy="709153"/>
+            <a:chOff x="3847378" y="546859"/>
+            <a:chExt cx="820157" cy="709153"/>
+          </a:xfrm>
+          <a:solidFill>
+            <a:srgbClr val="FFFF00"/>
+          </a:solidFill>
+        </p:grpSpPr>
+        <p:sp>
+          <p:nvSpPr>
+            <p:cNvPr id="7" name="Corde 6"/>
+            <p:cNvSpPr/>
+            <p:nvPr/>
+          </p:nvSpPr>
+          <p:spPr>
+            <a:xfrm>
+              <a:off x="3847378" y="546859"/>
+              <a:ext cx="820157" cy="709153"/>
+            </a:xfrm>
+            <a:prstGeom prst="chord">
+              <a:avLst/>
+            </a:prstGeom>
+            <a:grpFill/>
+            <a:ln w="38100">
+              <a:solidFill>
+                <a:schemeClr val="bg1"/>
+              </a:solidFill>
+            </a:ln>
+          </p:spPr>
+          <p:style>
+            <a:lnRef idx="2">
+              <a:schemeClr val="accent1">
+                <a:shade val="50000"/>
+              </a:schemeClr>
+            </a:lnRef>
+            <a:fillRef idx="1">
+              <a:schemeClr val="accent1"/>
+            </a:fillRef>
+            <a:effectRef idx="0">
+              <a:schemeClr val="accent1"/>
+            </a:effectRef>
+            <a:fontRef idx="minor">
+              <a:schemeClr val="lt1"/>
+            </a:fontRef>
+          </p:style>
+          <p:txBody>
+            <a:bodyPr rtlCol="0" anchor="ctr"/>
+            <a:lstStyle/>
+            <a:p>
+              <a:pPr algn="ctr"/>
+              <a:endParaRPr lang="fr-FR"/>
+            </a:p>
+          </p:txBody>
+        </p:sp>
+        <p:sp>
+          <p:nvSpPr>
+            <p:cNvPr id="36" name="Ellipse 35"/>
+            <p:cNvSpPr/>
+            <p:nvPr/>
+          </p:nvSpPr>
+          <p:spPr>
+            <a:xfrm>
+              <a:off x="4050905" y="801046"/>
+              <a:ext cx="234492" cy="249831"/>
+            </a:xfrm>
+            <a:prstGeom prst="ellipse">
+              <a:avLst/>
+            </a:prstGeom>
+            <a:solidFill>
+              <a:schemeClr val="bg1"/>
+            </a:solidFill>
+            <a:ln w="38100">
+              <a:solidFill>
+                <a:schemeClr val="bg1"/>
+              </a:solidFill>
+            </a:ln>
+          </p:spPr>
+          <p:style>
+            <a:lnRef idx="2">
+              <a:schemeClr val="accent1">
+                <a:shade val="50000"/>
+              </a:schemeClr>
+            </a:lnRef>
+            <a:fillRef idx="1">
+              <a:schemeClr val="accent1"/>
+            </a:fillRef>
+            <a:effectRef idx="0">
+              <a:schemeClr val="accent1"/>
+            </a:effectRef>
+            <a:fontRef idx="minor">
+              <a:schemeClr val="lt1"/>
+            </a:fontRef>
+          </p:style>
+          <p:txBody>
+            <a:bodyPr rtlCol="0" anchor="ctr"/>
+            <a:lstStyle/>
+            <a:p>
+              <a:pPr algn="ctr"/>
+              <a:endParaRPr lang="fr-FR"/>
+            </a:p>
+          </p:txBody>
+        </p:sp>
+      </p:grpSp>
+      <p:grpSp>
+        <p:nvGrpSpPr>
+          <p:cNvPr id="2" name="Groupe 1"/>
+          <p:cNvGrpSpPr/>
+          <p:nvPr/>
+        </p:nvGrpSpPr>
+        <p:grpSpPr>
+          <a:xfrm>
+            <a:off x="3070746" y="1400054"/>
+            <a:ext cx="612654" cy="556146"/>
+            <a:chOff x="3070746" y="1400054"/>
+            <a:chExt cx="612654" cy="556146"/>
+          </a:xfrm>
+        </p:grpSpPr>
+        <p:sp>
+          <p:nvSpPr>
+            <p:cNvPr id="5" name="Rectangle 4"/>
+            <p:cNvSpPr/>
+            <p:nvPr/>
+          </p:nvSpPr>
+          <p:spPr>
+            <a:xfrm>
+              <a:off x="3070746" y="1400054"/>
+              <a:ext cx="612654" cy="556146"/>
+            </a:xfrm>
+            <a:prstGeom prst="rect">
+              <a:avLst/>
+            </a:prstGeom>
+            <a:solidFill>
+              <a:srgbClr val="FF0000"/>
+            </a:solidFill>
+            <a:ln w="38100">
+              <a:solidFill>
+                <a:schemeClr val="bg1"/>
+              </a:solidFill>
+            </a:ln>
+          </p:spPr>
+          <p:style>
+            <a:lnRef idx="2">
+              <a:schemeClr val="accent1">
+                <a:shade val="50000"/>
+              </a:schemeClr>
+            </a:lnRef>
+            <a:fillRef idx="1">
+              <a:schemeClr val="accent1"/>
+            </a:fillRef>
+            <a:effectRef idx="0">
+              <a:schemeClr val="accent1"/>
+            </a:effectRef>
+            <a:fontRef idx="minor">
+              <a:schemeClr val="lt1"/>
+            </a:fontRef>
+          </p:style>
+          <p:txBody>
+            <a:bodyPr rtlCol="0" anchor="ctr"/>
+            <a:lstStyle/>
+            <a:p>
+              <a:pPr algn="ctr"/>
+              <a:endParaRPr lang="fr-FR"/>
+            </a:p>
+          </p:txBody>
+        </p:sp>
+        <p:sp>
+          <p:nvSpPr>
+            <p:cNvPr id="37" name="Ellipse 36"/>
+            <p:cNvSpPr/>
+            <p:nvPr/>
+          </p:nvSpPr>
+          <p:spPr>
+            <a:xfrm>
+              <a:off x="3215779" y="1544670"/>
+              <a:ext cx="299310" cy="305237"/>
+            </a:xfrm>
+            <a:prstGeom prst="ellipse">
+              <a:avLst/>
+            </a:prstGeom>
+            <a:solidFill>
+              <a:schemeClr val="bg1"/>
+            </a:solidFill>
+            <a:ln w="38100">
+              <a:solidFill>
+                <a:schemeClr val="bg1"/>
+              </a:solidFill>
+            </a:ln>
+          </p:spPr>
+          <p:style>
+            <a:lnRef idx="2">
+              <a:schemeClr val="accent1">
+                <a:shade val="50000"/>
+              </a:schemeClr>
+            </a:lnRef>
+            <a:fillRef idx="1">
+              <a:schemeClr val="accent1"/>
+            </a:fillRef>
+            <a:effectRef idx="0">
+              <a:schemeClr val="accent1"/>
+            </a:effectRef>
+            <a:fontRef idx="minor">
+              <a:schemeClr val="lt1"/>
+            </a:fontRef>
+          </p:style>
+          <p:txBody>
+            <a:bodyPr rtlCol="0" anchor="ctr"/>
+            <a:lstStyle/>
+            <a:p>
+              <a:pPr algn="ctr"/>
+              <a:endParaRPr lang="fr-FR"/>
+            </a:p>
+          </p:txBody>
+        </p:sp>
+      </p:grpSp>
     </p:spTree>
     <p:extLst>
       <p:ext uri="{BB962C8B-B14F-4D97-AF65-F5344CB8AC3E}">

</xml_diff>

<commit_message>
- avatar sur ecran
</commit_message>
<xml_diff>
--- a/IHM_image et maquette.pptx
+++ b/IHM_image et maquette.pptx
@@ -4902,20 +4902,20 @@
       </p:pic>
       <p:sp>
         <p:nvSpPr>
-          <p:cNvPr id="6" name="Ellipse 5"/>
+          <p:cNvPr id="7" name="Corde 6"/>
           <p:cNvSpPr/>
           <p:nvPr/>
         </p:nvSpPr>
         <p:spPr>
           <a:xfrm>
-            <a:off x="5641137" y="942082"/>
-            <a:ext cx="638830" cy="640495"/>
-          </a:xfrm>
-          <a:prstGeom prst="ellipse">
+            <a:off x="3847378" y="546859"/>
+            <a:ext cx="820157" cy="709153"/>
+          </a:xfrm>
+          <a:prstGeom prst="chord">
             <a:avLst/>
           </a:prstGeom>
           <a:solidFill>
-            <a:srgbClr val="0070C0"/>
+            <a:srgbClr val="FFFF00"/>
           </a:solidFill>
           <a:ln w="38100">
             <a:solidFill>
@@ -4950,20 +4950,20 @@
       </p:sp>
       <p:sp>
         <p:nvSpPr>
-          <p:cNvPr id="8" name="Triangle isocèle 7"/>
+          <p:cNvPr id="5" name="Rectangle 4"/>
           <p:cNvSpPr/>
           <p:nvPr/>
         </p:nvSpPr>
         <p:spPr>
           <a:xfrm>
-            <a:off x="4488691" y="1404038"/>
-            <a:ext cx="896890" cy="666013"/>
-          </a:xfrm>
-          <a:prstGeom prst="triangle">
+            <a:off x="2965447" y="1706880"/>
+            <a:ext cx="612654" cy="556146"/>
+          </a:xfrm>
+          <a:prstGeom prst="rect">
             <a:avLst/>
           </a:prstGeom>
           <a:solidFill>
-            <a:srgbClr val="00B050"/>
+            <a:srgbClr val="FF0000"/>
           </a:solidFill>
           <a:ln w="38100">
             <a:solidFill>
@@ -4996,102 +4996,117 @@
           </a:p>
         </p:txBody>
       </p:sp>
-      <p:sp>
-        <p:nvSpPr>
-          <p:cNvPr id="7" name="Corde 6"/>
-          <p:cNvSpPr/>
+      <p:grpSp>
+        <p:nvGrpSpPr>
+          <p:cNvPr id="2" name="Groupe 1"/>
+          <p:cNvGrpSpPr/>
           <p:nvPr/>
-        </p:nvSpPr>
-        <p:spPr>
-          <a:xfrm>
-            <a:off x="3847378" y="546859"/>
-            <a:ext cx="820157" cy="709153"/>
-          </a:xfrm>
-          <a:prstGeom prst="chord">
-            <a:avLst/>
-          </a:prstGeom>
-          <a:solidFill>
-            <a:srgbClr val="FFFF00"/>
-          </a:solidFill>
-          <a:ln w="38100">
+        </p:nvGrpSpPr>
+        <p:grpSpPr>
+          <a:xfrm>
+            <a:off x="4488691" y="1404038"/>
+            <a:ext cx="896890" cy="666013"/>
+            <a:chOff x="4488691" y="1404038"/>
+            <a:chExt cx="896890" cy="666013"/>
+          </a:xfrm>
+        </p:grpSpPr>
+        <p:sp>
+          <p:nvSpPr>
+            <p:cNvPr id="8" name="Triangle isocèle 7"/>
+            <p:cNvSpPr/>
+            <p:nvPr/>
+          </p:nvSpPr>
+          <p:spPr>
+            <a:xfrm>
+              <a:off x="4488691" y="1404038"/>
+              <a:ext cx="896890" cy="666013"/>
+            </a:xfrm>
+            <a:prstGeom prst="triangle">
+              <a:avLst/>
+            </a:prstGeom>
+            <a:solidFill>
+              <a:srgbClr val="00B050"/>
+            </a:solidFill>
+            <a:ln w="38100">
+              <a:solidFill>
+                <a:schemeClr val="tx1"/>
+              </a:solidFill>
+            </a:ln>
+          </p:spPr>
+          <p:style>
+            <a:lnRef idx="2">
+              <a:schemeClr val="accent1">
+                <a:shade val="50000"/>
+              </a:schemeClr>
+            </a:lnRef>
+            <a:fillRef idx="1">
+              <a:schemeClr val="accent1"/>
+            </a:fillRef>
+            <a:effectRef idx="0">
+              <a:schemeClr val="accent1"/>
+            </a:effectRef>
+            <a:fontRef idx="minor">
+              <a:schemeClr val="lt1"/>
+            </a:fontRef>
+          </p:style>
+          <p:txBody>
+            <a:bodyPr rtlCol="0" anchor="ctr"/>
+            <a:lstStyle/>
+            <a:p>
+              <a:pPr algn="ctr"/>
+              <a:endParaRPr lang="fr-FR"/>
+            </a:p>
+          </p:txBody>
+        </p:sp>
+        <p:sp>
+          <p:nvSpPr>
+            <p:cNvPr id="6" name="Ellipse 5"/>
+            <p:cNvSpPr/>
+            <p:nvPr/>
+          </p:nvSpPr>
+          <p:spPr>
+            <a:xfrm>
+              <a:off x="4777428" y="1638502"/>
+              <a:ext cx="319415" cy="360099"/>
+            </a:xfrm>
+            <a:prstGeom prst="ellipse">
+              <a:avLst/>
+            </a:prstGeom>
             <a:solidFill>
               <a:schemeClr val="tx1"/>
             </a:solidFill>
-          </a:ln>
-        </p:spPr>
-        <p:style>
-          <a:lnRef idx="2">
-            <a:schemeClr val="accent1">
-              <a:shade val="50000"/>
-            </a:schemeClr>
-          </a:lnRef>
-          <a:fillRef idx="1">
-            <a:schemeClr val="accent1"/>
-          </a:fillRef>
-          <a:effectRef idx="0">
-            <a:schemeClr val="accent1"/>
-          </a:effectRef>
-          <a:fontRef idx="minor">
-            <a:schemeClr val="lt1"/>
-          </a:fontRef>
-        </p:style>
-        <p:txBody>
-          <a:bodyPr rtlCol="0" anchor="ctr"/>
-          <a:lstStyle/>
-          <a:p>
-            <a:pPr algn="ctr"/>
-            <a:endParaRPr lang="fr-FR"/>
-          </a:p>
-        </p:txBody>
-      </p:sp>
-      <p:sp>
-        <p:nvSpPr>
-          <p:cNvPr id="5" name="Rectangle 4"/>
-          <p:cNvSpPr/>
-          <p:nvPr/>
-        </p:nvSpPr>
-        <p:spPr>
-          <a:xfrm>
-            <a:off x="2965447" y="1706880"/>
-            <a:ext cx="612654" cy="556146"/>
-          </a:xfrm>
-          <a:prstGeom prst="rect">
-            <a:avLst/>
-          </a:prstGeom>
-          <a:solidFill>
-            <a:srgbClr val="FF0000"/>
-          </a:solidFill>
-          <a:ln w="38100">
-            <a:solidFill>
-              <a:schemeClr val="tx1"/>
-            </a:solidFill>
-          </a:ln>
-        </p:spPr>
-        <p:style>
-          <a:lnRef idx="2">
-            <a:schemeClr val="accent1">
-              <a:shade val="50000"/>
-            </a:schemeClr>
-          </a:lnRef>
-          <a:fillRef idx="1">
-            <a:schemeClr val="accent1"/>
-          </a:fillRef>
-          <a:effectRef idx="0">
-            <a:schemeClr val="accent1"/>
-          </a:effectRef>
-          <a:fontRef idx="minor">
-            <a:schemeClr val="lt1"/>
-          </a:fontRef>
-        </p:style>
-        <p:txBody>
-          <a:bodyPr rtlCol="0" anchor="ctr"/>
-          <a:lstStyle/>
-          <a:p>
-            <a:pPr algn="ctr"/>
-            <a:endParaRPr lang="fr-FR"/>
-          </a:p>
-        </p:txBody>
-      </p:sp>
+            <a:ln w="38100">
+              <a:solidFill>
+                <a:schemeClr val="tx1"/>
+              </a:solidFill>
+            </a:ln>
+          </p:spPr>
+          <p:style>
+            <a:lnRef idx="2">
+              <a:schemeClr val="accent1">
+                <a:shade val="50000"/>
+              </a:schemeClr>
+            </a:lnRef>
+            <a:fillRef idx="1">
+              <a:schemeClr val="accent1"/>
+            </a:fillRef>
+            <a:effectRef idx="0">
+              <a:schemeClr val="accent1"/>
+            </a:effectRef>
+            <a:fontRef idx="minor">
+              <a:schemeClr val="lt1"/>
+            </a:fontRef>
+          </p:style>
+          <p:txBody>
+            <a:bodyPr rtlCol="0" anchor="ctr"/>
+            <a:lstStyle/>
+            <a:p>
+              <a:pPr algn="ctr"/>
+              <a:endParaRPr lang="fr-FR"/>
+            </a:p>
+          </p:txBody>
+        </p:sp>
+      </p:grpSp>
     </p:spTree>
     <p:extLst>
       <p:ext uri="{BB962C8B-B14F-4D97-AF65-F5344CB8AC3E}">

</xml_diff>